<commit_message>
Gudumholm IF WebApi - Added Identity and 2FA Login.
</commit_message>
<xml_diff>
--- a/SUNHEDSPLATFORMEN.pptx
+++ b/SUNHEDSPLATFORMEN.pptx
@@ -5,14 +5,15 @@
     <p:sldMasterId id="2147483648" r:id="rId1"/>
   </p:sldMasterIdLst>
   <p:notesMasterIdLst>
-    <p:notesMasterId r:id="rId7"/>
+    <p:notesMasterId r:id="rId8"/>
   </p:notesMasterIdLst>
   <p:sldIdLst>
     <p:sldId id="256" r:id="rId2"/>
-    <p:sldId id="257" r:id="rId3"/>
-    <p:sldId id="258" r:id="rId4"/>
-    <p:sldId id="259" r:id="rId5"/>
-    <p:sldId id="260" r:id="rId6"/>
+    <p:sldId id="261" r:id="rId3"/>
+    <p:sldId id="257" r:id="rId4"/>
+    <p:sldId id="258" r:id="rId5"/>
+    <p:sldId id="259" r:id="rId6"/>
+    <p:sldId id="260" r:id="rId7"/>
   </p:sldIdLst>
   <p:sldSz cx="12192000" cy="6858000"/>
   <p:notesSz cx="6858000" cy="9144000"/>
@@ -111,6 +112,11 @@
       </a:defRPr>
     </a:lvl9pPr>
   </p:defaultTextStyle>
+  <p:extLst>
+    <p:ext uri="{EFAFB233-063F-42B5-8137-9DF3F51BA10A}">
+      <p15:sldGuideLst xmlns:p15="http://schemas.microsoft.com/office/powerpoint/2012/main"/>
+    </p:ext>
+  </p:extLst>
 </p:presentation>
 </file>
 
@@ -620,7 +626,7 @@
           <a:p>
             <a:fld id="{DD8D9F18-A203-444A-877C-A128830382B4}" type="slidenum">
               <a:rPr lang="en-US" smtClean="0"/>
-              <a:t>2</a:t>
+              <a:t>3</a:t>
             </a:fld>
             <a:endParaRPr lang="en-US"/>
           </a:p>
@@ -835,7 +841,7 @@
           <a:p>
             <a:fld id="{DD8D9F18-A203-444A-877C-A128830382B4}" type="slidenum">
               <a:rPr lang="en-US" smtClean="0"/>
-              <a:t>3</a:t>
+              <a:t>4</a:t>
             </a:fld>
             <a:endParaRPr lang="en-US"/>
           </a:p>
@@ -948,7 +954,7 @@
           <a:p>
             <a:fld id="{DD8D9F18-A203-444A-877C-A128830382B4}" type="slidenum">
               <a:rPr lang="en-US" smtClean="0"/>
-              <a:t>4</a:t>
+              <a:t>5</a:t>
             </a:fld>
             <a:endParaRPr lang="en-US"/>
           </a:p>
@@ -8624,13 +8630,13 @@
   <p:clrMapOvr>
     <a:masterClrMapping/>
   </p:clrMapOvr>
-  <mc:AlternateContent xmlns:mc="http://schemas.openxmlformats.org/markup-compatibility/2006">
-    <mc:Choice xmlns:p14="http://schemas.microsoft.com/office/powerpoint/2010/main" Requires="p14">
+  <mc:AlternateContent xmlns:mc="http://schemas.openxmlformats.org/markup-compatibility/2006" xmlns:p14="http://schemas.microsoft.com/office/powerpoint/2010/main">
+    <mc:Choice Requires="p14">
       <p:transition spd="slow" p14:dur="800">
         <p:circle/>
       </p:transition>
     </mc:Choice>
-    <mc:Fallback>
+    <mc:Fallback xmlns="">
       <p:transition spd="slow">
         <p:circle/>
       </p:transition>
@@ -8792,10 +8798,10 @@
       </p:grpSpPr>
       <p:sp>
         <p:nvSpPr>
-          <p:cNvPr id="2" name="Titel 1">
+          <p:cNvPr id="6" name="Titel 5">
             <a:extLst>
               <a:ext uri="{FF2B5EF4-FFF2-40B4-BE49-F238E27FC236}">
-                <a16:creationId xmlns:a16="http://schemas.microsoft.com/office/drawing/2014/main" id="{AE478B63-FBC4-0CA4-2E37-47F92CABE1A3}"/>
+                <a16:creationId xmlns:a16="http://schemas.microsoft.com/office/drawing/2014/main" id="{3F7D497A-2ACA-20D1-2BFB-14313B19C3C5}"/>
               </a:ext>
             </a:extLst>
           </p:cNvPr>
@@ -8806,76 +8812,65 @@
             <p:ph type="title"/>
           </p:nvPr>
         </p:nvSpPr>
-        <p:spPr/>
-        <p:txBody>
-          <a:bodyPr>
+        <p:spPr>
+          <a:xfrm>
+            <a:off x="194872" y="4631961"/>
+            <a:ext cx="10099309" cy="1191718"/>
+          </a:xfrm>
+        </p:spPr>
+        <p:txBody>
+          <a:bodyPr numCol="1" anchor="ctr">
             <a:normAutofit/>
           </a:bodyPr>
           <a:lstStyle/>
           <a:p>
             <a:r>
-              <a:rPr lang="da-DK" sz="5400" dirty="0"/>
-              <a:t>Leverandør</a:t>
-            </a:r>
-            <a:endParaRPr lang="en-US" sz="5400" dirty="0"/>
-          </a:p>
-        </p:txBody>
-      </p:sp>
-      <p:sp>
-        <p:nvSpPr>
-          <p:cNvPr id="3" name="Pladsholder til indhold 2">
+              <a:rPr lang="da-DK" sz="4000" dirty="0"/>
+              <a:t>Eksempel på Sundhedsplatformen UI</a:t>
+            </a:r>
+            <a:endParaRPr lang="en-US" sz="4000" dirty="0"/>
+          </a:p>
+        </p:txBody>
+      </p:sp>
+      <p:pic>
+        <p:nvPicPr>
+          <p:cNvPr id="9" name="Billede 8">
             <a:extLst>
               <a:ext uri="{FF2B5EF4-FFF2-40B4-BE49-F238E27FC236}">
-                <a16:creationId xmlns:a16="http://schemas.microsoft.com/office/drawing/2014/main" id="{0AD3F7A8-76B3-9D87-A84D-72F4B635BF35}"/>
+                <a16:creationId xmlns:a16="http://schemas.microsoft.com/office/drawing/2014/main" id="{DC72E8F3-0C12-AC89-CC08-9C2B8BA944A7}"/>
               </a:ext>
             </a:extLst>
           </p:cNvPr>
-          <p:cNvSpPr>
-            <a:spLocks noGrp="1"/>
-          </p:cNvSpPr>
-          <p:nvPr>
-            <p:ph idx="1"/>
-          </p:nvPr>
-        </p:nvSpPr>
-        <p:spPr/>
-        <p:txBody>
-          <a:bodyPr/>
-          <a:lstStyle/>
-          <a:p>
-            <a:r>
-              <a:rPr lang="da-DK" dirty="0" err="1"/>
-              <a:t>Epic</a:t>
-            </a:r>
-            <a:r>
-              <a:rPr lang="da-DK" dirty="0"/>
-              <a:t> Systems Corporation.</a:t>
-            </a:r>
-            <a:endParaRPr lang="en-US" dirty="0"/>
-          </a:p>
-          <a:p>
-            <a:r>
-              <a:rPr lang="da-DK" dirty="0"/>
-              <a:t>Leverandør af patientjournals-/EPJ systemer globalt.</a:t>
-            </a:r>
-          </a:p>
-          <a:p>
-            <a:r>
-              <a:rPr lang="da-DK" dirty="0"/>
-              <a:t>Blev udvalgt af Region Hovedstaden og Sjælland til at levere et system i 2013.</a:t>
-            </a:r>
-          </a:p>
-          <a:p>
-            <a:r>
-              <a:rPr lang="da-DK" dirty="0"/>
-              <a:t>Er kendt for at være markedsleder inden for større EPJ-systemer, med mange hospitaler som kunder.</a:t>
-            </a:r>
-          </a:p>
-        </p:txBody>
-      </p:sp>
+          <p:cNvPicPr>
+            <a:picLocks noChangeAspect="1"/>
+          </p:cNvPicPr>
+          <p:nvPr/>
+        </p:nvPicPr>
+        <p:blipFill>
+          <a:blip r:embed="rId2"/>
+          <a:stretch>
+            <a:fillRect/>
+          </a:stretch>
+        </p:blipFill>
+        <p:spPr>
+          <a:xfrm>
+            <a:off x="1855971" y="49823"/>
+            <a:ext cx="7947596" cy="4468495"/>
+          </a:xfrm>
+          <a:prstGeom prst="rect">
+            <a:avLst/>
+          </a:prstGeom>
+          <a:ln>
+            <a:solidFill>
+              <a:schemeClr val="bg1"/>
+            </a:solidFill>
+          </a:ln>
+        </p:spPr>
+      </p:pic>
     </p:spTree>
     <p:extLst>
       <p:ext uri="{BB962C8B-B14F-4D97-AF65-F5344CB8AC3E}">
-        <p14:creationId xmlns:p14="http://schemas.microsoft.com/office/powerpoint/2010/main" val="2137160823"/>
+        <p14:creationId xmlns:p14="http://schemas.microsoft.com/office/powerpoint/2010/main" val="4269349886"/>
       </p:ext>
     </p:extLst>
   </p:cSld>
@@ -8931,7 +8926,7 @@
                                           </p:stCondLst>
                                         </p:cTn>
                                         <p:tgtEl>
-                                          <p:spTgt spid="2"/>
+                                          <p:spTgt spid="6"/>
                                         </p:tgtEl>
                                         <p:attrNameLst>
                                           <p:attrName>style.visibility</p:attrName>
@@ -8945,7 +8940,7 @@
                                       <p:cBhvr>
                                         <p:cTn id="7" dur="2000"/>
                                         <p:tgtEl>
-                                          <p:spTgt spid="2"/>
+                                          <p:spTgt spid="6"/>
                                         </p:tgtEl>
                                       </p:cBhvr>
                                     </p:animEffect>
@@ -8955,40 +8950,27 @@
                             </p:childTnLst>
                           </p:cTn>
                         </p:par>
-                      </p:childTnLst>
-                    </p:cTn>
-                  </p:par>
-                  <p:par>
-                    <p:cTn id="8" fill="hold">
-                      <p:stCondLst>
-                        <p:cond delay="indefinite"/>
-                      </p:stCondLst>
-                      <p:childTnLst>
                         <p:par>
-                          <p:cTn id="9" fill="hold">
+                          <p:cTn id="8" fill="hold">
                             <p:stCondLst>
-                              <p:cond delay="0"/>
+                              <p:cond delay="2000"/>
                             </p:stCondLst>
                             <p:childTnLst>
                               <p:par>
-                                <p:cTn id="10" presetID="10" presetClass="entr" presetSubtype="0" fill="hold" grpId="0" nodeType="clickEffect">
+                                <p:cTn id="9" presetID="10" presetClass="entr" presetSubtype="0" fill="hold" nodeType="afterEffect">
                                   <p:stCondLst>
                                     <p:cond delay="0"/>
                                   </p:stCondLst>
                                   <p:childTnLst>
                                     <p:set>
                                       <p:cBhvr>
-                                        <p:cTn id="11" dur="1" fill="hold">
+                                        <p:cTn id="10" dur="1" fill="hold">
                                           <p:stCondLst>
                                             <p:cond delay="0"/>
                                           </p:stCondLst>
                                         </p:cTn>
                                         <p:tgtEl>
-                                          <p:spTgt spid="3">
-                                            <p:txEl>
-                                              <p:pRg st="0" end="0"/>
-                                            </p:txEl>
-                                          </p:spTgt>
+                                          <p:spTgt spid="9"/>
                                         </p:tgtEl>
                                         <p:attrNameLst>
                                           <p:attrName>style.visibility</p:attrName>
@@ -9000,196 +8982,9 @@
                                     </p:set>
                                     <p:animEffect transition="in" filter="fade">
                                       <p:cBhvr>
-                                        <p:cTn id="12" dur="1000"/>
+                                        <p:cTn id="11" dur="2000"/>
                                         <p:tgtEl>
-                                          <p:spTgt spid="3">
-                                            <p:txEl>
-                                              <p:pRg st="0" end="0"/>
-                                            </p:txEl>
-                                          </p:spTgt>
-                                        </p:tgtEl>
-                                      </p:cBhvr>
-                                    </p:animEffect>
-                                  </p:childTnLst>
-                                </p:cTn>
-                              </p:par>
-                            </p:childTnLst>
-                          </p:cTn>
-                        </p:par>
-                      </p:childTnLst>
-                    </p:cTn>
-                  </p:par>
-                  <p:par>
-                    <p:cTn id="13" fill="hold">
-                      <p:stCondLst>
-                        <p:cond delay="indefinite"/>
-                      </p:stCondLst>
-                      <p:childTnLst>
-                        <p:par>
-                          <p:cTn id="14" fill="hold">
-                            <p:stCondLst>
-                              <p:cond delay="0"/>
-                            </p:stCondLst>
-                            <p:childTnLst>
-                              <p:par>
-                                <p:cTn id="15" presetID="10" presetClass="entr" presetSubtype="0" fill="hold" grpId="0" nodeType="clickEffect">
-                                  <p:stCondLst>
-                                    <p:cond delay="0"/>
-                                  </p:stCondLst>
-                                  <p:childTnLst>
-                                    <p:set>
-                                      <p:cBhvr>
-                                        <p:cTn id="16" dur="1" fill="hold">
-                                          <p:stCondLst>
-                                            <p:cond delay="0"/>
-                                          </p:stCondLst>
-                                        </p:cTn>
-                                        <p:tgtEl>
-                                          <p:spTgt spid="3">
-                                            <p:txEl>
-                                              <p:pRg st="1" end="1"/>
-                                            </p:txEl>
-                                          </p:spTgt>
-                                        </p:tgtEl>
-                                        <p:attrNameLst>
-                                          <p:attrName>style.visibility</p:attrName>
-                                        </p:attrNameLst>
-                                      </p:cBhvr>
-                                      <p:to>
-                                        <p:strVal val="visible"/>
-                                      </p:to>
-                                    </p:set>
-                                    <p:animEffect transition="in" filter="fade">
-                                      <p:cBhvr>
-                                        <p:cTn id="17" dur="1000"/>
-                                        <p:tgtEl>
-                                          <p:spTgt spid="3">
-                                            <p:txEl>
-                                              <p:pRg st="1" end="1"/>
-                                            </p:txEl>
-                                          </p:spTgt>
-                                        </p:tgtEl>
-                                      </p:cBhvr>
-                                    </p:animEffect>
-                                  </p:childTnLst>
-                                </p:cTn>
-                              </p:par>
-                            </p:childTnLst>
-                          </p:cTn>
-                        </p:par>
-                      </p:childTnLst>
-                    </p:cTn>
-                  </p:par>
-                  <p:par>
-                    <p:cTn id="18" fill="hold">
-                      <p:stCondLst>
-                        <p:cond delay="indefinite"/>
-                      </p:stCondLst>
-                      <p:childTnLst>
-                        <p:par>
-                          <p:cTn id="19" fill="hold">
-                            <p:stCondLst>
-                              <p:cond delay="0"/>
-                            </p:stCondLst>
-                            <p:childTnLst>
-                              <p:par>
-                                <p:cTn id="20" presetID="10" presetClass="entr" presetSubtype="0" fill="hold" grpId="0" nodeType="clickEffect">
-                                  <p:stCondLst>
-                                    <p:cond delay="0"/>
-                                  </p:stCondLst>
-                                  <p:childTnLst>
-                                    <p:set>
-                                      <p:cBhvr>
-                                        <p:cTn id="21" dur="1" fill="hold">
-                                          <p:stCondLst>
-                                            <p:cond delay="0"/>
-                                          </p:stCondLst>
-                                        </p:cTn>
-                                        <p:tgtEl>
-                                          <p:spTgt spid="3">
-                                            <p:txEl>
-                                              <p:pRg st="2" end="2"/>
-                                            </p:txEl>
-                                          </p:spTgt>
-                                        </p:tgtEl>
-                                        <p:attrNameLst>
-                                          <p:attrName>style.visibility</p:attrName>
-                                        </p:attrNameLst>
-                                      </p:cBhvr>
-                                      <p:to>
-                                        <p:strVal val="visible"/>
-                                      </p:to>
-                                    </p:set>
-                                    <p:animEffect transition="in" filter="fade">
-                                      <p:cBhvr>
-                                        <p:cTn id="22" dur="1000"/>
-                                        <p:tgtEl>
-                                          <p:spTgt spid="3">
-                                            <p:txEl>
-                                              <p:pRg st="2" end="2"/>
-                                            </p:txEl>
-                                          </p:spTgt>
-                                        </p:tgtEl>
-                                      </p:cBhvr>
-                                    </p:animEffect>
-                                  </p:childTnLst>
-                                </p:cTn>
-                              </p:par>
-                            </p:childTnLst>
-                          </p:cTn>
-                        </p:par>
-                      </p:childTnLst>
-                    </p:cTn>
-                  </p:par>
-                  <p:par>
-                    <p:cTn id="23" fill="hold">
-                      <p:stCondLst>
-                        <p:cond delay="indefinite"/>
-                      </p:stCondLst>
-                      <p:childTnLst>
-                        <p:par>
-                          <p:cTn id="24" fill="hold">
-                            <p:stCondLst>
-                              <p:cond delay="0"/>
-                            </p:stCondLst>
-                            <p:childTnLst>
-                              <p:par>
-                                <p:cTn id="25" presetID="10" presetClass="entr" presetSubtype="0" fill="hold" grpId="0" nodeType="clickEffect">
-                                  <p:stCondLst>
-                                    <p:cond delay="0"/>
-                                  </p:stCondLst>
-                                  <p:childTnLst>
-                                    <p:set>
-                                      <p:cBhvr>
-                                        <p:cTn id="26" dur="1" fill="hold">
-                                          <p:stCondLst>
-                                            <p:cond delay="0"/>
-                                          </p:stCondLst>
-                                        </p:cTn>
-                                        <p:tgtEl>
-                                          <p:spTgt spid="3">
-                                            <p:txEl>
-                                              <p:pRg st="3" end="3"/>
-                                            </p:txEl>
-                                          </p:spTgt>
-                                        </p:tgtEl>
-                                        <p:attrNameLst>
-                                          <p:attrName>style.visibility</p:attrName>
-                                        </p:attrNameLst>
-                                      </p:cBhvr>
-                                      <p:to>
-                                        <p:strVal val="visible"/>
-                                      </p:to>
-                                    </p:set>
-                                    <p:animEffect transition="in" filter="fade">
-                                      <p:cBhvr>
-                                        <p:cTn id="27" dur="1000"/>
-                                        <p:tgtEl>
-                                          <p:spTgt spid="3">
-                                            <p:txEl>
-                                              <p:pRg st="3" end="3"/>
-                                            </p:txEl>
-                                          </p:spTgt>
+                                          <p:spTgt spid="9"/>
                                         </p:tgtEl>
                                       </p:cBhvr>
                                     </p:animEffect>
@@ -9224,8 +9019,7 @@
       </p:par>
     </p:tnLst>
     <p:bldLst>
-      <p:bldP spid="2" grpId="0"/>
-      <p:bldP spid="3" grpId="0" build="p"/>
+      <p:bldP spid="6" grpId="0"/>
     </p:bldLst>
   </p:timing>
 </p:sld>
@@ -9253,7 +9047,7 @@
           <p:cNvPr id="2" name="Titel 1">
             <a:extLst>
               <a:ext uri="{FF2B5EF4-FFF2-40B4-BE49-F238E27FC236}">
-                <a16:creationId xmlns:a16="http://schemas.microsoft.com/office/drawing/2014/main" id="{57A53D71-DEE0-1867-D01C-A39E436A3686}"/>
+                <a16:creationId xmlns:a16="http://schemas.microsoft.com/office/drawing/2014/main" id="{AE478B63-FBC4-0CA4-2E37-47F92CABE1A3}"/>
               </a:ext>
             </a:extLst>
           </p:cNvPr>
@@ -9273,7 +9067,7 @@
           <a:p>
             <a:r>
               <a:rPr lang="da-DK" sz="5400" dirty="0"/>
-              <a:t>Projektet</a:t>
+              <a:t>Leverandør</a:t>
             </a:r>
             <a:endParaRPr lang="en-US" sz="5400" dirty="0"/>
           </a:p>
@@ -9284,7 +9078,7 @@
           <p:cNvPr id="3" name="Pladsholder til indhold 2">
             <a:extLst>
               <a:ext uri="{FF2B5EF4-FFF2-40B4-BE49-F238E27FC236}">
-                <a16:creationId xmlns:a16="http://schemas.microsoft.com/office/drawing/2014/main" id="{D3B95F89-9F5B-20AC-2DDA-A3281584E357}"/>
+                <a16:creationId xmlns:a16="http://schemas.microsoft.com/office/drawing/2014/main" id="{0AD3F7A8-76B3-9D87-A84D-72F4B635BF35}"/>
               </a:ext>
             </a:extLst>
           </p:cNvPr>
@@ -9301,26 +9095,31 @@
           <a:lstStyle/>
           <a:p>
             <a:r>
+              <a:rPr lang="da-DK" dirty="0" err="1"/>
+              <a:t>Epic</a:t>
+            </a:r>
+            <a:r>
               <a:rPr lang="da-DK" dirty="0"/>
-              <a:t>Sundhedsplatformen</a:t>
-            </a:r>
+              <a:t> Systems Corporation.</a:t>
+            </a:r>
+            <a:endParaRPr lang="en-US" dirty="0"/>
           </a:p>
           <a:p>
             <a:r>
               <a:rPr lang="da-DK" dirty="0"/>
-              <a:t>Et samlet moderne system</a:t>
+              <a:t>Leverandør af patientjournals-/EPJ systemer globalt.</a:t>
             </a:r>
           </a:p>
           <a:p>
             <a:r>
               <a:rPr lang="da-DK" dirty="0"/>
-              <a:t>Udrulning</a:t>
+              <a:t>Blev udvalgt af Region Hovedstaden og Sjælland til at levere et system i 2013.</a:t>
             </a:r>
           </a:p>
           <a:p>
             <a:r>
               <a:rPr lang="da-DK" dirty="0"/>
-              <a:t>Min Sundhedsplatform</a:t>
+              <a:t>Er kendt for at være markedsleder inden for større EPJ-systemer, med mange hospitaler som kunder.</a:t>
             </a:r>
           </a:p>
         </p:txBody>
@@ -9328,20 +9127,20 @@
     </p:spTree>
     <p:extLst>
       <p:ext uri="{BB962C8B-B14F-4D97-AF65-F5344CB8AC3E}">
-        <p14:creationId xmlns:p14="http://schemas.microsoft.com/office/powerpoint/2010/main" val="1472535775"/>
+        <p14:creationId xmlns:p14="http://schemas.microsoft.com/office/powerpoint/2010/main" val="2137160823"/>
       </p:ext>
     </p:extLst>
   </p:cSld>
   <p:clrMapOvr>
     <a:masterClrMapping/>
   </p:clrMapOvr>
-  <mc:AlternateContent xmlns:mc="http://schemas.openxmlformats.org/markup-compatibility/2006">
-    <mc:Choice xmlns:p14="http://schemas.microsoft.com/office/powerpoint/2010/main" Requires="p14">
+  <mc:AlternateContent xmlns:mc="http://schemas.openxmlformats.org/markup-compatibility/2006" xmlns:p14="http://schemas.microsoft.com/office/powerpoint/2010/main">
+    <mc:Choice Requires="p14">
       <p:transition spd="slow">
         <p14:flash/>
       </p:transition>
     </mc:Choice>
-    <mc:Fallback>
+    <mc:Fallback xmlns="">
       <p:transition spd="slow">
         <p:fade/>
       </p:transition>
@@ -9706,6 +9505,459 @@
           <p:cNvPr id="2" name="Titel 1">
             <a:extLst>
               <a:ext uri="{FF2B5EF4-FFF2-40B4-BE49-F238E27FC236}">
+                <a16:creationId xmlns:a16="http://schemas.microsoft.com/office/drawing/2014/main" id="{57A53D71-DEE0-1867-D01C-A39E436A3686}"/>
+              </a:ext>
+            </a:extLst>
+          </p:cNvPr>
+          <p:cNvSpPr>
+            <a:spLocks noGrp="1"/>
+          </p:cNvSpPr>
+          <p:nvPr>
+            <p:ph type="title"/>
+          </p:nvPr>
+        </p:nvSpPr>
+        <p:spPr/>
+        <p:txBody>
+          <a:bodyPr>
+            <a:normAutofit/>
+          </a:bodyPr>
+          <a:lstStyle/>
+          <a:p>
+            <a:r>
+              <a:rPr lang="da-DK" sz="5400" dirty="0"/>
+              <a:t>Projektet</a:t>
+            </a:r>
+            <a:endParaRPr lang="en-US" sz="5400" dirty="0"/>
+          </a:p>
+        </p:txBody>
+      </p:sp>
+      <p:sp>
+        <p:nvSpPr>
+          <p:cNvPr id="3" name="Pladsholder til indhold 2">
+            <a:extLst>
+              <a:ext uri="{FF2B5EF4-FFF2-40B4-BE49-F238E27FC236}">
+                <a16:creationId xmlns:a16="http://schemas.microsoft.com/office/drawing/2014/main" id="{D3B95F89-9F5B-20AC-2DDA-A3281584E357}"/>
+              </a:ext>
+            </a:extLst>
+          </p:cNvPr>
+          <p:cNvSpPr>
+            <a:spLocks noGrp="1"/>
+          </p:cNvSpPr>
+          <p:nvPr>
+            <p:ph idx="1"/>
+          </p:nvPr>
+        </p:nvSpPr>
+        <p:spPr/>
+        <p:txBody>
+          <a:bodyPr/>
+          <a:lstStyle/>
+          <a:p>
+            <a:r>
+              <a:rPr lang="da-DK" dirty="0"/>
+              <a:t>Sundhedsplatformen</a:t>
+            </a:r>
+          </a:p>
+          <a:p>
+            <a:r>
+              <a:rPr lang="da-DK" dirty="0"/>
+              <a:t>Et samlet moderne system</a:t>
+            </a:r>
+          </a:p>
+          <a:p>
+            <a:r>
+              <a:rPr lang="da-DK" dirty="0"/>
+              <a:t>Udrulning</a:t>
+            </a:r>
+          </a:p>
+          <a:p>
+            <a:r>
+              <a:rPr lang="da-DK" dirty="0"/>
+              <a:t>Min Sundhedsplatform</a:t>
+            </a:r>
+          </a:p>
+        </p:txBody>
+      </p:sp>
+    </p:spTree>
+    <p:extLst>
+      <p:ext uri="{BB962C8B-B14F-4D97-AF65-F5344CB8AC3E}">
+        <p14:creationId xmlns:p14="http://schemas.microsoft.com/office/powerpoint/2010/main" val="1472535775"/>
+      </p:ext>
+    </p:extLst>
+  </p:cSld>
+  <p:clrMapOvr>
+    <a:masterClrMapping/>
+  </p:clrMapOvr>
+  <mc:AlternateContent xmlns:mc="http://schemas.openxmlformats.org/markup-compatibility/2006" xmlns:p14="http://schemas.microsoft.com/office/powerpoint/2010/main">
+    <mc:Choice Requires="p14">
+      <p:transition spd="slow">
+        <p14:flash/>
+      </p:transition>
+    </mc:Choice>
+    <mc:Fallback xmlns="">
+      <p:transition spd="slow">
+        <p:fade/>
+      </p:transition>
+    </mc:Fallback>
+  </mc:AlternateContent>
+  <p:timing>
+    <p:tnLst>
+      <p:par>
+        <p:cTn id="1" dur="indefinite" restart="never" nodeType="tmRoot">
+          <p:childTnLst>
+            <p:seq concurrent="1" nextAc="seek">
+              <p:cTn id="2" dur="indefinite" nodeType="mainSeq">
+                <p:childTnLst>
+                  <p:par>
+                    <p:cTn id="3" fill="hold">
+                      <p:stCondLst>
+                        <p:cond delay="indefinite"/>
+                        <p:cond evt="onBegin" delay="0">
+                          <p:tn val="2"/>
+                        </p:cond>
+                      </p:stCondLst>
+                      <p:childTnLst>
+                        <p:par>
+                          <p:cTn id="4" fill="hold">
+                            <p:stCondLst>
+                              <p:cond delay="0"/>
+                            </p:stCondLst>
+                            <p:childTnLst>
+                              <p:par>
+                                <p:cTn id="5" presetID="10" presetClass="entr" presetSubtype="0" fill="hold" grpId="0" nodeType="afterEffect">
+                                  <p:stCondLst>
+                                    <p:cond delay="0"/>
+                                  </p:stCondLst>
+                                  <p:childTnLst>
+                                    <p:set>
+                                      <p:cBhvr>
+                                        <p:cTn id="6" dur="1" fill="hold">
+                                          <p:stCondLst>
+                                            <p:cond delay="0"/>
+                                          </p:stCondLst>
+                                        </p:cTn>
+                                        <p:tgtEl>
+                                          <p:spTgt spid="2"/>
+                                        </p:tgtEl>
+                                        <p:attrNameLst>
+                                          <p:attrName>style.visibility</p:attrName>
+                                        </p:attrNameLst>
+                                      </p:cBhvr>
+                                      <p:to>
+                                        <p:strVal val="visible"/>
+                                      </p:to>
+                                    </p:set>
+                                    <p:animEffect transition="in" filter="fade">
+                                      <p:cBhvr>
+                                        <p:cTn id="7" dur="2000"/>
+                                        <p:tgtEl>
+                                          <p:spTgt spid="2"/>
+                                        </p:tgtEl>
+                                      </p:cBhvr>
+                                    </p:animEffect>
+                                  </p:childTnLst>
+                                </p:cTn>
+                              </p:par>
+                            </p:childTnLst>
+                          </p:cTn>
+                        </p:par>
+                      </p:childTnLst>
+                    </p:cTn>
+                  </p:par>
+                  <p:par>
+                    <p:cTn id="8" fill="hold">
+                      <p:stCondLst>
+                        <p:cond delay="indefinite"/>
+                      </p:stCondLst>
+                      <p:childTnLst>
+                        <p:par>
+                          <p:cTn id="9" fill="hold">
+                            <p:stCondLst>
+                              <p:cond delay="0"/>
+                            </p:stCondLst>
+                            <p:childTnLst>
+                              <p:par>
+                                <p:cTn id="10" presetID="10" presetClass="entr" presetSubtype="0" fill="hold" grpId="0" nodeType="clickEffect">
+                                  <p:stCondLst>
+                                    <p:cond delay="0"/>
+                                  </p:stCondLst>
+                                  <p:childTnLst>
+                                    <p:set>
+                                      <p:cBhvr>
+                                        <p:cTn id="11" dur="1" fill="hold">
+                                          <p:stCondLst>
+                                            <p:cond delay="0"/>
+                                          </p:stCondLst>
+                                        </p:cTn>
+                                        <p:tgtEl>
+                                          <p:spTgt spid="3">
+                                            <p:txEl>
+                                              <p:pRg st="0" end="0"/>
+                                            </p:txEl>
+                                          </p:spTgt>
+                                        </p:tgtEl>
+                                        <p:attrNameLst>
+                                          <p:attrName>style.visibility</p:attrName>
+                                        </p:attrNameLst>
+                                      </p:cBhvr>
+                                      <p:to>
+                                        <p:strVal val="visible"/>
+                                      </p:to>
+                                    </p:set>
+                                    <p:animEffect transition="in" filter="fade">
+                                      <p:cBhvr>
+                                        <p:cTn id="12" dur="1000"/>
+                                        <p:tgtEl>
+                                          <p:spTgt spid="3">
+                                            <p:txEl>
+                                              <p:pRg st="0" end="0"/>
+                                            </p:txEl>
+                                          </p:spTgt>
+                                        </p:tgtEl>
+                                      </p:cBhvr>
+                                    </p:animEffect>
+                                  </p:childTnLst>
+                                </p:cTn>
+                              </p:par>
+                            </p:childTnLst>
+                          </p:cTn>
+                        </p:par>
+                      </p:childTnLst>
+                    </p:cTn>
+                  </p:par>
+                  <p:par>
+                    <p:cTn id="13" fill="hold">
+                      <p:stCondLst>
+                        <p:cond delay="indefinite"/>
+                      </p:stCondLst>
+                      <p:childTnLst>
+                        <p:par>
+                          <p:cTn id="14" fill="hold">
+                            <p:stCondLst>
+                              <p:cond delay="0"/>
+                            </p:stCondLst>
+                            <p:childTnLst>
+                              <p:par>
+                                <p:cTn id="15" presetID="10" presetClass="entr" presetSubtype="0" fill="hold" grpId="0" nodeType="clickEffect">
+                                  <p:stCondLst>
+                                    <p:cond delay="0"/>
+                                  </p:stCondLst>
+                                  <p:childTnLst>
+                                    <p:set>
+                                      <p:cBhvr>
+                                        <p:cTn id="16" dur="1" fill="hold">
+                                          <p:stCondLst>
+                                            <p:cond delay="0"/>
+                                          </p:stCondLst>
+                                        </p:cTn>
+                                        <p:tgtEl>
+                                          <p:spTgt spid="3">
+                                            <p:txEl>
+                                              <p:pRg st="1" end="1"/>
+                                            </p:txEl>
+                                          </p:spTgt>
+                                        </p:tgtEl>
+                                        <p:attrNameLst>
+                                          <p:attrName>style.visibility</p:attrName>
+                                        </p:attrNameLst>
+                                      </p:cBhvr>
+                                      <p:to>
+                                        <p:strVal val="visible"/>
+                                      </p:to>
+                                    </p:set>
+                                    <p:animEffect transition="in" filter="fade">
+                                      <p:cBhvr>
+                                        <p:cTn id="17" dur="1000"/>
+                                        <p:tgtEl>
+                                          <p:spTgt spid="3">
+                                            <p:txEl>
+                                              <p:pRg st="1" end="1"/>
+                                            </p:txEl>
+                                          </p:spTgt>
+                                        </p:tgtEl>
+                                      </p:cBhvr>
+                                    </p:animEffect>
+                                  </p:childTnLst>
+                                </p:cTn>
+                              </p:par>
+                            </p:childTnLst>
+                          </p:cTn>
+                        </p:par>
+                      </p:childTnLst>
+                    </p:cTn>
+                  </p:par>
+                  <p:par>
+                    <p:cTn id="18" fill="hold">
+                      <p:stCondLst>
+                        <p:cond delay="indefinite"/>
+                      </p:stCondLst>
+                      <p:childTnLst>
+                        <p:par>
+                          <p:cTn id="19" fill="hold">
+                            <p:stCondLst>
+                              <p:cond delay="0"/>
+                            </p:stCondLst>
+                            <p:childTnLst>
+                              <p:par>
+                                <p:cTn id="20" presetID="10" presetClass="entr" presetSubtype="0" fill="hold" grpId="0" nodeType="clickEffect">
+                                  <p:stCondLst>
+                                    <p:cond delay="0"/>
+                                  </p:stCondLst>
+                                  <p:childTnLst>
+                                    <p:set>
+                                      <p:cBhvr>
+                                        <p:cTn id="21" dur="1" fill="hold">
+                                          <p:stCondLst>
+                                            <p:cond delay="0"/>
+                                          </p:stCondLst>
+                                        </p:cTn>
+                                        <p:tgtEl>
+                                          <p:spTgt spid="3">
+                                            <p:txEl>
+                                              <p:pRg st="2" end="2"/>
+                                            </p:txEl>
+                                          </p:spTgt>
+                                        </p:tgtEl>
+                                        <p:attrNameLst>
+                                          <p:attrName>style.visibility</p:attrName>
+                                        </p:attrNameLst>
+                                      </p:cBhvr>
+                                      <p:to>
+                                        <p:strVal val="visible"/>
+                                      </p:to>
+                                    </p:set>
+                                    <p:animEffect transition="in" filter="fade">
+                                      <p:cBhvr>
+                                        <p:cTn id="22" dur="1000"/>
+                                        <p:tgtEl>
+                                          <p:spTgt spid="3">
+                                            <p:txEl>
+                                              <p:pRg st="2" end="2"/>
+                                            </p:txEl>
+                                          </p:spTgt>
+                                        </p:tgtEl>
+                                      </p:cBhvr>
+                                    </p:animEffect>
+                                  </p:childTnLst>
+                                </p:cTn>
+                              </p:par>
+                            </p:childTnLst>
+                          </p:cTn>
+                        </p:par>
+                      </p:childTnLst>
+                    </p:cTn>
+                  </p:par>
+                  <p:par>
+                    <p:cTn id="23" fill="hold">
+                      <p:stCondLst>
+                        <p:cond delay="indefinite"/>
+                      </p:stCondLst>
+                      <p:childTnLst>
+                        <p:par>
+                          <p:cTn id="24" fill="hold">
+                            <p:stCondLst>
+                              <p:cond delay="0"/>
+                            </p:stCondLst>
+                            <p:childTnLst>
+                              <p:par>
+                                <p:cTn id="25" presetID="10" presetClass="entr" presetSubtype="0" fill="hold" grpId="0" nodeType="clickEffect">
+                                  <p:stCondLst>
+                                    <p:cond delay="0"/>
+                                  </p:stCondLst>
+                                  <p:childTnLst>
+                                    <p:set>
+                                      <p:cBhvr>
+                                        <p:cTn id="26" dur="1" fill="hold">
+                                          <p:stCondLst>
+                                            <p:cond delay="0"/>
+                                          </p:stCondLst>
+                                        </p:cTn>
+                                        <p:tgtEl>
+                                          <p:spTgt spid="3">
+                                            <p:txEl>
+                                              <p:pRg st="3" end="3"/>
+                                            </p:txEl>
+                                          </p:spTgt>
+                                        </p:tgtEl>
+                                        <p:attrNameLst>
+                                          <p:attrName>style.visibility</p:attrName>
+                                        </p:attrNameLst>
+                                      </p:cBhvr>
+                                      <p:to>
+                                        <p:strVal val="visible"/>
+                                      </p:to>
+                                    </p:set>
+                                    <p:animEffect transition="in" filter="fade">
+                                      <p:cBhvr>
+                                        <p:cTn id="27" dur="1000"/>
+                                        <p:tgtEl>
+                                          <p:spTgt spid="3">
+                                            <p:txEl>
+                                              <p:pRg st="3" end="3"/>
+                                            </p:txEl>
+                                          </p:spTgt>
+                                        </p:tgtEl>
+                                      </p:cBhvr>
+                                    </p:animEffect>
+                                  </p:childTnLst>
+                                </p:cTn>
+                              </p:par>
+                            </p:childTnLst>
+                          </p:cTn>
+                        </p:par>
+                      </p:childTnLst>
+                    </p:cTn>
+                  </p:par>
+                </p:childTnLst>
+              </p:cTn>
+              <p:prevCondLst>
+                <p:cond evt="onPrev" delay="0">
+                  <p:tgtEl>
+                    <p:sldTgt/>
+                  </p:tgtEl>
+                </p:cond>
+              </p:prevCondLst>
+              <p:nextCondLst>
+                <p:cond evt="onNext" delay="0">
+                  <p:tgtEl>
+                    <p:sldTgt/>
+                  </p:tgtEl>
+                </p:cond>
+              </p:nextCondLst>
+            </p:seq>
+          </p:childTnLst>
+        </p:cTn>
+      </p:par>
+    </p:tnLst>
+    <p:bldLst>
+      <p:bldP spid="2" grpId="0"/>
+      <p:bldP spid="3" grpId="0" build="p"/>
+    </p:bldLst>
+  </p:timing>
+</p:sld>
+</file>
+
+<file path=ppt/slides/slide5.xml><?xml version="1.0" encoding="utf-8"?>
+<p:sld xmlns:a="http://schemas.openxmlformats.org/drawingml/2006/main" xmlns:r="http://schemas.openxmlformats.org/officeDocument/2006/relationships" xmlns:p="http://schemas.openxmlformats.org/presentationml/2006/main">
+  <p:cSld>
+    <p:spTree>
+      <p:nvGrpSpPr>
+        <p:cNvPr id="1" name=""/>
+        <p:cNvGrpSpPr/>
+        <p:nvPr/>
+      </p:nvGrpSpPr>
+      <p:grpSpPr>
+        <a:xfrm>
+          <a:off x="0" y="0"/>
+          <a:ext cx="0" cy="0"/>
+          <a:chOff x="0" y="0"/>
+          <a:chExt cx="0" cy="0"/>
+        </a:xfrm>
+      </p:grpSpPr>
+      <p:sp>
+        <p:nvSpPr>
+          <p:cNvPr id="2" name="Titel 1">
+            <a:extLst>
+              <a:ext uri="{FF2B5EF4-FFF2-40B4-BE49-F238E27FC236}">
                 <a16:creationId xmlns:a16="http://schemas.microsoft.com/office/drawing/2014/main" id="{DE9C9FA0-3F15-09BB-555A-B5073CED83B3}"/>
               </a:ext>
             </a:extLst>
@@ -9783,13 +10035,13 @@
   <p:clrMapOvr>
     <a:masterClrMapping/>
   </p:clrMapOvr>
-  <mc:AlternateContent xmlns:mc="http://schemas.openxmlformats.org/markup-compatibility/2006">
-    <mc:Choice xmlns:p14="http://schemas.microsoft.com/office/powerpoint/2010/main" Requires="p14">
+  <mc:AlternateContent xmlns:mc="http://schemas.openxmlformats.org/markup-compatibility/2006" xmlns:p14="http://schemas.microsoft.com/office/powerpoint/2010/main">
+    <mc:Choice Requires="p14">
       <p:transition spd="slow">
         <p14:flash/>
       </p:transition>
     </mc:Choice>
-    <mc:Fallback>
+    <mc:Fallback xmlns="">
       <p:transition spd="slow">
         <p:fade/>
       </p:transition>
@@ -10071,7 +10323,7 @@
 </p:sld>
 </file>
 
-<file path=ppt/slides/slide5.xml><?xml version="1.0" encoding="utf-8"?>
+<file path=ppt/slides/slide6.xml><?xml version="1.0" encoding="utf-8"?>
 <p:sld xmlns:a="http://schemas.openxmlformats.org/drawingml/2006/main" xmlns:r="http://schemas.openxmlformats.org/officeDocument/2006/relationships" xmlns:p="http://schemas.openxmlformats.org/presentationml/2006/main">
   <p:cSld>
     <p:spTree>
@@ -10402,13 +10654,13 @@
   <p:clrMapOvr>
     <a:masterClrMapping/>
   </p:clrMapOvr>
-  <mc:AlternateContent xmlns:mc="http://schemas.openxmlformats.org/markup-compatibility/2006">
-    <mc:Choice xmlns:p14="http://schemas.microsoft.com/office/powerpoint/2010/main" Requires="p14">
+  <mc:AlternateContent xmlns:mc="http://schemas.openxmlformats.org/markup-compatibility/2006" xmlns:p14="http://schemas.microsoft.com/office/powerpoint/2010/main">
+    <mc:Choice Requires="p14">
       <p:transition spd="slow">
         <p14:flash/>
       </p:transition>
     </mc:Choice>
-    <mc:Fallback>
+    <mc:Fallback xmlns="">
       <p:transition spd="slow">
         <p:fade/>
       </p:transition>
@@ -11359,4 +11611,24 @@
     </a:ext>
   </a:extLst>
 </a:theme>
+</file>
+
+<file path=ppt/webextensions/taskpanes.xml><?xml version="1.0" encoding="utf-8"?>
+<wetp:taskpanes xmlns:wetp="http://schemas.microsoft.com/office/webextensions/taskpanes/2010/11">
+  <wetp:taskpane dockstate="right" visibility="0" width="350" row="6">
+    <wetp:webextensionref xmlns:r="http://schemas.openxmlformats.org/officeDocument/2006/relationships" r:id="rId1"/>
+  </wetp:taskpane>
+</wetp:taskpanes>
+</file>
+
+<file path=ppt/webextensions/webextension1.xml><?xml version="1.0" encoding="utf-8"?>
+<we:webextension xmlns:we="http://schemas.microsoft.com/office/webextensions/webextension/2010/11" id="{64B7934A-09AD-475C-A0E0-4CDAF1232968}">
+  <we:reference id="WA200005669" version="2.0.0.0" store="Omex" storeType="OMEX"/>
+  <we:alternateReferences>
+    <we:reference id="WA200005669" version="2.0.0.0" store="WA200005669" storeType="OMEX"/>
+  </we:alternateReferences>
+  <we:properties/>
+  <we:bindings/>
+  <we:snapshot xmlns:r="http://schemas.openxmlformats.org/officeDocument/2006/relationships"/>
+</we:webextension>
 </file>
</xml_diff>